<commit_message>
Added final files with project report and screenshots
</commit_message>
<xml_diff>
--- a/pbda_fall16.pptx
+++ b/pbda_fall16.pptx
@@ -238,14 +238,14 @@
           <a:effectLst/>
           <a:extLst>
             <a:ext uri="{909E8E84-426E-40dd-AFC4-6F175D3DCCD1}">
-              <a14:hiddenFill xmlns:a14="http://schemas.microsoft.com/office/drawing/2010/main" xmlns="">
+              <a14:hiddenFill xmlns="" xmlns:a14="http://schemas.microsoft.com/office/drawing/2010/main">
                 <a:solidFill>
                   <a:schemeClr val="accent1"/>
                 </a:solidFill>
               </a14:hiddenFill>
             </a:ext>
             <a:ext uri="{91240B29-F687-4f45-9708-019B960494DF}">
-              <a14:hiddenLine xmlns:a14="http://schemas.microsoft.com/office/drawing/2010/main" xmlns="" w="9525">
+              <a14:hiddenLine xmlns="" xmlns:a14="http://schemas.microsoft.com/office/drawing/2010/main" w="9525">
                 <a:solidFill>
                   <a:schemeClr val="tx1"/>
                 </a:solidFill>
@@ -255,7 +255,7 @@
               </a14:hiddenLine>
             </a:ext>
             <a:ext uri="{AF507438-7753-43e0-B8FC-AC1667EBCBE1}">
-              <a14:hiddenEffects xmlns:a14="http://schemas.microsoft.com/office/drawing/2010/main" xmlns="">
+              <a14:hiddenEffects xmlns="" xmlns:a14="http://schemas.microsoft.com/office/drawing/2010/main">
                 <a:effectLst>
                   <a:outerShdw dist="35921" dir="2700000" algn="ctr" rotWithShape="0">
                     <a:schemeClr val="bg2"/>
@@ -311,14 +311,14 @@
           <a:effectLst/>
           <a:extLst>
             <a:ext uri="{909E8E84-426E-40dd-AFC4-6F175D3DCCD1}">
-              <a14:hiddenFill xmlns:a14="http://schemas.microsoft.com/office/drawing/2010/main" xmlns="">
+              <a14:hiddenFill xmlns="" xmlns:a14="http://schemas.microsoft.com/office/drawing/2010/main">
                 <a:solidFill>
                   <a:schemeClr val="accent1"/>
                 </a:solidFill>
               </a14:hiddenFill>
             </a:ext>
             <a:ext uri="{91240B29-F687-4f45-9708-019B960494DF}">
-              <a14:hiddenLine xmlns:a14="http://schemas.microsoft.com/office/drawing/2010/main" xmlns="" w="9525">
+              <a14:hiddenLine xmlns="" xmlns:a14="http://schemas.microsoft.com/office/drawing/2010/main" w="9525">
                 <a:solidFill>
                   <a:schemeClr val="tx1"/>
                 </a:solidFill>
@@ -328,7 +328,7 @@
               </a14:hiddenLine>
             </a:ext>
             <a:ext uri="{AF507438-7753-43e0-B8FC-AC1667EBCBE1}">
-              <a14:hiddenEffects xmlns:a14="http://schemas.microsoft.com/office/drawing/2010/main" xmlns="">
+              <a14:hiddenEffects xmlns="" xmlns:a14="http://schemas.microsoft.com/office/drawing/2010/main">
                 <a:effectLst>
                   <a:outerShdw dist="35921" dir="2700000" algn="ctr" rotWithShape="0">
                     <a:schemeClr val="bg2"/>
@@ -389,14 +389,14 @@
           <a:effectLst/>
           <a:extLst>
             <a:ext uri="{909E8E84-426E-40dd-AFC4-6F175D3DCCD1}">
-              <a14:hiddenFill xmlns:a14="http://schemas.microsoft.com/office/drawing/2010/main" xmlns="">
+              <a14:hiddenFill xmlns="" xmlns:a14="http://schemas.microsoft.com/office/drawing/2010/main">
                 <a:solidFill>
                   <a:srgbClr val="FFFFFF"/>
                 </a:solidFill>
               </a14:hiddenFill>
             </a:ext>
             <a:ext uri="{AF507438-7753-43e0-B8FC-AC1667EBCBE1}">
-              <a14:hiddenEffects xmlns:a14="http://schemas.microsoft.com/office/drawing/2010/main" xmlns="">
+              <a14:hiddenEffects xmlns="" xmlns:a14="http://schemas.microsoft.com/office/drawing/2010/main">
                 <a:effectLst>
                   <a:outerShdw dist="35921" dir="2700000" algn="ctr" rotWithShape="0">
                     <a:srgbClr val="808080"/>
@@ -405,7 +405,7 @@
               </a14:hiddenEffects>
             </a:ext>
             <a:ext uri="{53640926-AAD7-44d8-BBD7-CCE9431645EC}">
-              <a14:shadowObscured xmlns:a14="http://schemas.microsoft.com/office/drawing/2010/main" xmlns="" val="1"/>
+              <a14:shadowObscured xmlns="" xmlns:a14="http://schemas.microsoft.com/office/drawing/2010/main" val="1"/>
             </a:ext>
           </a:extLst>
         </p:spPr>
@@ -435,14 +435,14 @@
           <a:effectLst/>
           <a:extLst>
             <a:ext uri="{909E8E84-426E-40dd-AFC4-6F175D3DCCD1}">
-              <a14:hiddenFill xmlns:a14="http://schemas.microsoft.com/office/drawing/2010/main" xmlns="">
+              <a14:hiddenFill xmlns="" xmlns:a14="http://schemas.microsoft.com/office/drawing/2010/main">
                 <a:solidFill>
                   <a:schemeClr val="accent1"/>
                 </a:solidFill>
               </a14:hiddenFill>
             </a:ext>
             <a:ext uri="{91240B29-F687-4f45-9708-019B960494DF}">
-              <a14:hiddenLine xmlns:a14="http://schemas.microsoft.com/office/drawing/2010/main" xmlns="" w="9525">
+              <a14:hiddenLine xmlns="" xmlns:a14="http://schemas.microsoft.com/office/drawing/2010/main" w="9525">
                 <a:solidFill>
                   <a:schemeClr val="tx1"/>
                 </a:solidFill>
@@ -452,7 +452,7 @@
               </a14:hiddenLine>
             </a:ext>
             <a:ext uri="{AF507438-7753-43e0-B8FC-AC1667EBCBE1}">
-              <a14:hiddenEffects xmlns:a14="http://schemas.microsoft.com/office/drawing/2010/main" xmlns="">
+              <a14:hiddenEffects xmlns="" xmlns:a14="http://schemas.microsoft.com/office/drawing/2010/main">
                 <a:effectLst>
                   <a:outerShdw dist="35921" dir="2700000" algn="ctr" rotWithShape="0">
                     <a:schemeClr val="bg2"/>
@@ -531,14 +531,14 @@
           <a:effectLst/>
           <a:extLst>
             <a:ext uri="{909E8E84-426E-40dd-AFC4-6F175D3DCCD1}">
-              <a14:hiddenFill xmlns:a14="http://schemas.microsoft.com/office/drawing/2010/main" xmlns="">
+              <a14:hiddenFill xmlns="" xmlns:a14="http://schemas.microsoft.com/office/drawing/2010/main">
                 <a:solidFill>
                   <a:schemeClr val="accent1"/>
                 </a:solidFill>
               </a14:hiddenFill>
             </a:ext>
             <a:ext uri="{91240B29-F687-4f45-9708-019B960494DF}">
-              <a14:hiddenLine xmlns:a14="http://schemas.microsoft.com/office/drawing/2010/main" xmlns="" w="9525">
+              <a14:hiddenLine xmlns="" xmlns:a14="http://schemas.microsoft.com/office/drawing/2010/main" w="9525">
                 <a:solidFill>
                   <a:schemeClr val="tx1"/>
                 </a:solidFill>
@@ -548,7 +548,7 @@
               </a14:hiddenLine>
             </a:ext>
             <a:ext uri="{AF507438-7753-43e0-B8FC-AC1667EBCBE1}">
-              <a14:hiddenEffects xmlns:a14="http://schemas.microsoft.com/office/drawing/2010/main" xmlns="">
+              <a14:hiddenEffects xmlns="" xmlns:a14="http://schemas.microsoft.com/office/drawing/2010/main">
                 <a:effectLst>
                   <a:outerShdw dist="35921" dir="2700000" algn="ctr" rotWithShape="0">
                     <a:schemeClr val="bg2"/>
@@ -604,14 +604,14 @@
           <a:effectLst/>
           <a:extLst>
             <a:ext uri="{909E8E84-426E-40dd-AFC4-6F175D3DCCD1}">
-              <a14:hiddenFill xmlns:a14="http://schemas.microsoft.com/office/drawing/2010/main" xmlns="">
+              <a14:hiddenFill xmlns="" xmlns:a14="http://schemas.microsoft.com/office/drawing/2010/main">
                 <a:solidFill>
                   <a:schemeClr val="accent1"/>
                 </a:solidFill>
               </a14:hiddenFill>
             </a:ext>
             <a:ext uri="{91240B29-F687-4f45-9708-019B960494DF}">
-              <a14:hiddenLine xmlns:a14="http://schemas.microsoft.com/office/drawing/2010/main" xmlns="" w="9525">
+              <a14:hiddenLine xmlns="" xmlns:a14="http://schemas.microsoft.com/office/drawing/2010/main" w="9525">
                 <a:solidFill>
                   <a:schemeClr val="tx1"/>
                 </a:solidFill>
@@ -621,7 +621,7 @@
               </a14:hiddenLine>
             </a:ext>
             <a:ext uri="{AF507438-7753-43e0-B8FC-AC1667EBCBE1}">
-              <a14:hiddenEffects xmlns:a14="http://schemas.microsoft.com/office/drawing/2010/main" xmlns="">
+              <a14:hiddenEffects xmlns="" xmlns:a14="http://schemas.microsoft.com/office/drawing/2010/main">
                 <a:effectLst>
                   <a:outerShdw dist="35921" dir="2700000" algn="ctr" rotWithShape="0">
                     <a:schemeClr val="bg2"/>
@@ -1104,7 +1104,7 @@
           <a:effectLst/>
           <a:extLst>
             <a:ext uri="{91240B29-F687-4f45-9708-019B960494DF}">
-              <a14:hiddenLine xmlns:a14="http://schemas.microsoft.com/office/drawing/2010/main" xmlns="" w="9525">
+              <a14:hiddenLine xmlns="" xmlns:a14="http://schemas.microsoft.com/office/drawing/2010/main" w="9525">
                 <a:solidFill>
                   <a:schemeClr val="tx1"/>
                 </a:solidFill>
@@ -1114,7 +1114,7 @@
               </a14:hiddenLine>
             </a:ext>
             <a:ext uri="{AF507438-7753-43e0-B8FC-AC1667EBCBE1}">
-              <a14:hiddenEffects xmlns:a14="http://schemas.microsoft.com/office/drawing/2010/main" xmlns="">
+              <a14:hiddenEffects xmlns="" xmlns:a14="http://schemas.microsoft.com/office/drawing/2010/main">
                 <a:effectLst>
                   <a:outerShdw dist="35921" dir="2700000" algn="ctr" rotWithShape="0">
                     <a:schemeClr val="bg2"/>
@@ -1266,7 +1266,7 @@
           <a:effectLst/>
           <a:extLst>
             <a:ext uri="{91240B29-F687-4f45-9708-019B960494DF}">
-              <a14:hiddenLine xmlns:a14="http://schemas.microsoft.com/office/drawing/2010/main" xmlns="" w="9525">
+              <a14:hiddenLine xmlns="" xmlns:a14="http://schemas.microsoft.com/office/drawing/2010/main" w="9525">
                 <a:solidFill>
                   <a:schemeClr val="tx1"/>
                 </a:solidFill>
@@ -1276,7 +1276,7 @@
               </a14:hiddenLine>
             </a:ext>
             <a:ext uri="{AF507438-7753-43e0-B8FC-AC1667EBCBE1}">
-              <a14:hiddenEffects xmlns:a14="http://schemas.microsoft.com/office/drawing/2010/main" xmlns="">
+              <a14:hiddenEffects xmlns="" xmlns:a14="http://schemas.microsoft.com/office/drawing/2010/main">
                 <a:effectLst>
                   <a:outerShdw dist="35921" dir="2700000" algn="ctr" rotWithShape="0">
                     <a:schemeClr val="bg2"/>
@@ -1428,7 +1428,7 @@
           <a:effectLst/>
           <a:extLst>
             <a:ext uri="{91240B29-F687-4f45-9708-019B960494DF}">
-              <a14:hiddenLine xmlns:a14="http://schemas.microsoft.com/office/drawing/2010/main" xmlns="" w="9525">
+              <a14:hiddenLine xmlns="" xmlns:a14="http://schemas.microsoft.com/office/drawing/2010/main" w="9525">
                 <a:solidFill>
                   <a:schemeClr val="tx1"/>
                 </a:solidFill>
@@ -1438,7 +1438,7 @@
               </a14:hiddenLine>
             </a:ext>
             <a:ext uri="{AF507438-7753-43e0-B8FC-AC1667EBCBE1}">
-              <a14:hiddenEffects xmlns:a14="http://schemas.microsoft.com/office/drawing/2010/main" xmlns="">
+              <a14:hiddenEffects xmlns="" xmlns:a14="http://schemas.microsoft.com/office/drawing/2010/main">
                 <a:effectLst>
                   <a:outerShdw dist="35921" dir="2700000" algn="ctr" rotWithShape="0">
                     <a:schemeClr val="bg2"/>
@@ -2401,14 +2401,14 @@
           </a:ln>
           <a:extLst>
             <a:ext uri="{909E8E84-426E-40dd-AFC4-6F175D3DCCD1}">
-              <a14:hiddenFill xmlns:a14="http://schemas.microsoft.com/office/drawing/2010/main" xmlns="">
+              <a14:hiddenFill xmlns="" xmlns:a14="http://schemas.microsoft.com/office/drawing/2010/main">
                 <a:solidFill>
                   <a:srgbClr val="FFFFFF"/>
                 </a:solidFill>
               </a14:hiddenFill>
             </a:ext>
             <a:ext uri="{91240B29-F687-4f45-9708-019B960494DF}">
-              <a14:hiddenLine xmlns:a14="http://schemas.microsoft.com/office/drawing/2010/main" xmlns="" w="9525">
+              <a14:hiddenLine xmlns="" xmlns:a14="http://schemas.microsoft.com/office/drawing/2010/main" w="9525">
                 <a:solidFill>
                   <a:srgbClr val="000000"/>
                 </a:solidFill>
@@ -2448,12 +2448,12 @@
           <a:effectLst/>
           <a:extLst>
             <a:ext uri="{909E8E84-426E-40dd-AFC4-6F175D3DCCD1}">
-              <a14:hiddenFill xmlns:a14="http://schemas.microsoft.com/office/drawing/2010/main" xmlns="">
+              <a14:hiddenFill xmlns="" xmlns:a14="http://schemas.microsoft.com/office/drawing/2010/main">
                 <a:noFill/>
               </a14:hiddenFill>
             </a:ext>
             <a:ext uri="{AF507438-7753-43e0-B8FC-AC1667EBCBE1}">
-              <a14:hiddenEffects xmlns:a14="http://schemas.microsoft.com/office/drawing/2010/main" xmlns="">
+              <a14:hiddenEffects xmlns="" xmlns:a14="http://schemas.microsoft.com/office/drawing/2010/main">
                 <a:effectLst>
                   <a:outerShdw dist="35921" dir="2700000" algn="ctr" rotWithShape="0">
                     <a:schemeClr val="bg2"/>
@@ -2513,7 +2513,7 @@
             </a:ln>
             <a:extLst>
               <a:ext uri="{91240B29-F687-4f45-9708-019B960494DF}">
-                <a14:hiddenLine xmlns:a14="http://schemas.microsoft.com/office/drawing/2010/main" xmlns="" w="9525">
+                <a14:hiddenLine xmlns="" xmlns:a14="http://schemas.microsoft.com/office/drawing/2010/main" w="9525">
                   <a:solidFill>
                     <a:schemeClr val="tx1"/>
                   </a:solidFill>
@@ -2667,7 +2667,7 @@
             </a:ln>
             <a:extLst>
               <a:ext uri="{91240B29-F687-4f45-9708-019B960494DF}">
-                <a14:hiddenLine xmlns:a14="http://schemas.microsoft.com/office/drawing/2010/main" xmlns="" w="9525">
+                <a14:hiddenLine xmlns="" xmlns:a14="http://schemas.microsoft.com/office/drawing/2010/main" w="9525">
                   <a:solidFill>
                     <a:schemeClr val="tx1"/>
                   </a:solidFill>
@@ -2821,7 +2821,7 @@
             </a:ln>
             <a:extLst>
               <a:ext uri="{91240B29-F687-4f45-9708-019B960494DF}">
-                <a14:hiddenLine xmlns:a14="http://schemas.microsoft.com/office/drawing/2010/main" xmlns="" w="9525">
+                <a14:hiddenLine xmlns="" xmlns:a14="http://schemas.microsoft.com/office/drawing/2010/main" w="9525">
                   <a:solidFill>
                     <a:schemeClr val="tx1"/>
                   </a:solidFill>
@@ -2975,7 +2975,7 @@
             </a:ln>
             <a:extLst>
               <a:ext uri="{91240B29-F687-4f45-9708-019B960494DF}">
-                <a14:hiddenLine xmlns:a14="http://schemas.microsoft.com/office/drawing/2010/main" xmlns="" w="9525">
+                <a14:hiddenLine xmlns="" xmlns:a14="http://schemas.microsoft.com/office/drawing/2010/main" w="9525">
                   <a:solidFill>
                     <a:schemeClr val="tx1"/>
                   </a:solidFill>
@@ -3129,7 +3129,7 @@
             </a:ln>
             <a:extLst>
               <a:ext uri="{91240B29-F687-4f45-9708-019B960494DF}">
-                <a14:hiddenLine xmlns:a14="http://schemas.microsoft.com/office/drawing/2010/main" xmlns="" w="9525">
+                <a14:hiddenLine xmlns="" xmlns:a14="http://schemas.microsoft.com/office/drawing/2010/main" w="9525">
                   <a:solidFill>
                     <a:schemeClr val="tx1"/>
                   </a:solidFill>
@@ -3283,7 +3283,7 @@
             </a:ln>
             <a:extLst>
               <a:ext uri="{91240B29-F687-4f45-9708-019B960494DF}">
-                <a14:hiddenLine xmlns:a14="http://schemas.microsoft.com/office/drawing/2010/main" xmlns="" w="9525">
+                <a14:hiddenLine xmlns="" xmlns:a14="http://schemas.microsoft.com/office/drawing/2010/main" w="9525">
                   <a:solidFill>
                     <a:schemeClr val="tx1"/>
                   </a:solidFill>
@@ -3535,7 +3535,7 @@
             </a:ln>
             <a:extLst>
               <a:ext uri="{91240B29-F687-4f45-9708-019B960494DF}">
-                <a14:hiddenLine xmlns:a14="http://schemas.microsoft.com/office/drawing/2010/main" xmlns="" w="9525">
+                <a14:hiddenLine xmlns="" xmlns:a14="http://schemas.microsoft.com/office/drawing/2010/main" w="9525">
                   <a:solidFill>
                     <a:schemeClr val="tx1"/>
                   </a:solidFill>
@@ -3667,7 +3667,7 @@
             </a:ln>
             <a:extLst>
               <a:ext uri="{91240B29-F687-4f45-9708-019B960494DF}">
-                <a14:hiddenLine xmlns:a14="http://schemas.microsoft.com/office/drawing/2010/main" xmlns="" w="9525">
+                <a14:hiddenLine xmlns="" xmlns:a14="http://schemas.microsoft.com/office/drawing/2010/main" w="9525">
                   <a:solidFill>
                     <a:schemeClr val="tx1"/>
                   </a:solidFill>
@@ -3788,7 +3788,7 @@
             </a:ln>
             <a:extLst>
               <a:ext uri="{91240B29-F687-4f45-9708-019B960494DF}">
-                <a14:hiddenLine xmlns:a14="http://schemas.microsoft.com/office/drawing/2010/main" xmlns="" w="9525">
+                <a14:hiddenLine xmlns="" xmlns:a14="http://schemas.microsoft.com/office/drawing/2010/main" w="9525">
                   <a:solidFill>
                     <a:schemeClr val="tx1"/>
                   </a:solidFill>
@@ -3833,7 +3833,7 @@
             </a:ln>
             <a:extLst>
               <a:ext uri="{91240B29-F687-4f45-9708-019B960494DF}">
-                <a14:hiddenLine xmlns:a14="http://schemas.microsoft.com/office/drawing/2010/main" xmlns="" w="9525">
+                <a14:hiddenLine xmlns="" xmlns:a14="http://schemas.microsoft.com/office/drawing/2010/main" w="9525">
                   <a:solidFill>
                     <a:schemeClr val="tx1"/>
                   </a:solidFill>
@@ -7544,14 +7544,14 @@
           <a:effectLst/>
           <a:extLst>
             <a:ext uri="{909E8E84-426E-40dd-AFC4-6F175D3DCCD1}">
-              <a14:hiddenFill xmlns:a14="http://schemas.microsoft.com/office/drawing/2010/main" xmlns="">
+              <a14:hiddenFill xmlns="" xmlns:a14="http://schemas.microsoft.com/office/drawing/2010/main">
                 <a:solidFill>
                   <a:schemeClr val="accent1"/>
                 </a:solidFill>
               </a14:hiddenFill>
             </a:ext>
             <a:ext uri="{91240B29-F687-4f45-9708-019B960494DF}">
-              <a14:hiddenLine xmlns:a14="http://schemas.microsoft.com/office/drawing/2010/main" xmlns="" w="9525">
+              <a14:hiddenLine xmlns="" xmlns:a14="http://schemas.microsoft.com/office/drawing/2010/main" w="9525">
                 <a:solidFill>
                   <a:schemeClr val="tx1"/>
                 </a:solidFill>
@@ -7561,7 +7561,7 @@
               </a14:hiddenLine>
             </a:ext>
             <a:ext uri="{AF507438-7753-43e0-B8FC-AC1667EBCBE1}">
-              <a14:hiddenEffects xmlns:a14="http://schemas.microsoft.com/office/drawing/2010/main" xmlns="">
+              <a14:hiddenEffects xmlns="" xmlns:a14="http://schemas.microsoft.com/office/drawing/2010/main">
                 <a:effectLst>
                   <a:outerShdw dist="35921" dir="2700000" algn="ctr" rotWithShape="0">
                     <a:schemeClr val="bg2"/>
@@ -7612,14 +7612,14 @@
           <a:effectLst/>
           <a:extLst>
             <a:ext uri="{909E8E84-426E-40dd-AFC4-6F175D3DCCD1}">
-              <a14:hiddenFill xmlns:a14="http://schemas.microsoft.com/office/drawing/2010/main" xmlns="">
+              <a14:hiddenFill xmlns="" xmlns:a14="http://schemas.microsoft.com/office/drawing/2010/main">
                 <a:solidFill>
                   <a:schemeClr val="accent1"/>
                 </a:solidFill>
               </a14:hiddenFill>
             </a:ext>
             <a:ext uri="{91240B29-F687-4f45-9708-019B960494DF}">
-              <a14:hiddenLine xmlns:a14="http://schemas.microsoft.com/office/drawing/2010/main" xmlns="" w="9525">
+              <a14:hiddenLine xmlns="" xmlns:a14="http://schemas.microsoft.com/office/drawing/2010/main" w="9525">
                 <a:solidFill>
                   <a:schemeClr val="tx1"/>
                 </a:solidFill>
@@ -7629,7 +7629,7 @@
               </a14:hiddenLine>
             </a:ext>
             <a:ext uri="{AF507438-7753-43e0-B8FC-AC1667EBCBE1}">
-              <a14:hiddenEffects xmlns:a14="http://schemas.microsoft.com/office/drawing/2010/main" xmlns="">
+              <a14:hiddenEffects xmlns="" xmlns:a14="http://schemas.microsoft.com/office/drawing/2010/main">
                 <a:effectLst>
                   <a:outerShdw dist="35921" dir="2700000" algn="ctr" rotWithShape="0">
                     <a:schemeClr val="bg2"/>
@@ -7708,14 +7708,14 @@
           <a:effectLst/>
           <a:extLst>
             <a:ext uri="{909E8E84-426E-40dd-AFC4-6F175D3DCCD1}">
-              <a14:hiddenFill xmlns:a14="http://schemas.microsoft.com/office/drawing/2010/main" xmlns="">
+              <a14:hiddenFill xmlns="" xmlns:a14="http://schemas.microsoft.com/office/drawing/2010/main">
                 <a:solidFill>
                   <a:schemeClr val="accent1"/>
                 </a:solidFill>
               </a14:hiddenFill>
             </a:ext>
             <a:ext uri="{91240B29-F687-4f45-9708-019B960494DF}">
-              <a14:hiddenLine xmlns:a14="http://schemas.microsoft.com/office/drawing/2010/main" xmlns="" w="9525">
+              <a14:hiddenLine xmlns="" xmlns:a14="http://schemas.microsoft.com/office/drawing/2010/main" w="9525">
                 <a:solidFill>
                   <a:schemeClr val="tx1"/>
                 </a:solidFill>
@@ -7725,7 +7725,7 @@
               </a14:hiddenLine>
             </a:ext>
             <a:ext uri="{AF507438-7753-43e0-B8FC-AC1667EBCBE1}">
-              <a14:hiddenEffects xmlns:a14="http://schemas.microsoft.com/office/drawing/2010/main" xmlns="">
+              <a14:hiddenEffects xmlns="" xmlns:a14="http://schemas.microsoft.com/office/drawing/2010/main">
                 <a:effectLst>
                   <a:outerShdw dist="35921" dir="2700000" algn="ctr" rotWithShape="0">
                     <a:schemeClr val="bg2"/>
@@ -7789,12 +7789,12 @@
           <a:effectLst/>
           <a:extLst>
             <a:ext uri="{909E8E84-426E-40dd-AFC4-6F175D3DCCD1}">
-              <a14:hiddenFill xmlns:a14="http://schemas.microsoft.com/office/drawing/2010/main" xmlns="">
+              <a14:hiddenFill xmlns="" xmlns:a14="http://schemas.microsoft.com/office/drawing/2010/main">
                 <a:noFill/>
               </a14:hiddenFill>
             </a:ext>
             <a:ext uri="{AF507438-7753-43e0-B8FC-AC1667EBCBE1}">
-              <a14:hiddenEffects xmlns:a14="http://schemas.microsoft.com/office/drawing/2010/main" xmlns="">
+              <a14:hiddenEffects xmlns="" xmlns:a14="http://schemas.microsoft.com/office/drawing/2010/main">
                 <a:effectLst>
                   <a:outerShdw dist="35921" dir="2700000" algn="ctr" rotWithShape="0">
                     <a:schemeClr val="bg2"/>
@@ -8309,14 +8309,14 @@
           <a:effectLst/>
           <a:extLst>
             <a:ext uri="{909E8E84-426E-40dd-AFC4-6F175D3DCCD1}">
-              <a14:hiddenFill xmlns:a14="http://schemas.microsoft.com/office/drawing/2010/main" xmlns="">
+              <a14:hiddenFill xmlns="" xmlns:a14="http://schemas.microsoft.com/office/drawing/2010/main">
                 <a:solidFill>
                   <a:schemeClr val="accent1"/>
                 </a:solidFill>
               </a14:hiddenFill>
             </a:ext>
             <a:ext uri="{91240B29-F687-4f45-9708-019B960494DF}">
-              <a14:hiddenLine xmlns:a14="http://schemas.microsoft.com/office/drawing/2010/main" xmlns="" w="9525">
+              <a14:hiddenLine xmlns="" xmlns:a14="http://schemas.microsoft.com/office/drawing/2010/main" w="9525">
                 <a:solidFill>
                   <a:schemeClr val="tx1"/>
                 </a:solidFill>
@@ -8326,7 +8326,7 @@
               </a14:hiddenLine>
             </a:ext>
             <a:ext uri="{AF507438-7753-43e0-B8FC-AC1667EBCBE1}">
-              <a14:hiddenEffects xmlns:a14="http://schemas.microsoft.com/office/drawing/2010/main" xmlns="">
+              <a14:hiddenEffects xmlns="" xmlns:a14="http://schemas.microsoft.com/office/drawing/2010/main">
                 <a:effectLst>
                   <a:outerShdw dist="35921" dir="2700000" algn="ctr" rotWithShape="0">
                     <a:schemeClr val="bg2"/>
@@ -8394,12 +8394,12 @@
           <a:effectLst/>
           <a:extLst>
             <a:ext uri="{909E8E84-426E-40dd-AFC4-6F175D3DCCD1}">
-              <a14:hiddenFill xmlns:a14="http://schemas.microsoft.com/office/drawing/2010/main" xmlns="">
+              <a14:hiddenFill xmlns="" xmlns:a14="http://schemas.microsoft.com/office/drawing/2010/main">
                 <a:noFill/>
               </a14:hiddenFill>
             </a:ext>
             <a:ext uri="{AF507438-7753-43e0-B8FC-AC1667EBCBE1}">
-              <a14:hiddenEffects xmlns:a14="http://schemas.microsoft.com/office/drawing/2010/main" xmlns="">
+              <a14:hiddenEffects xmlns="" xmlns:a14="http://schemas.microsoft.com/office/drawing/2010/main">
                 <a:effectLst>
                   <a:outerShdw dist="35921" dir="2700000" algn="ctr" rotWithShape="0">
                     <a:schemeClr val="bg2"/>
@@ -8442,14 +8442,14 @@
           <a:effectLst/>
           <a:extLst>
             <a:ext uri="{909E8E84-426E-40dd-AFC4-6F175D3DCCD1}">
-              <a14:hiddenFill xmlns:a14="http://schemas.microsoft.com/office/drawing/2010/main" xmlns="">
+              <a14:hiddenFill xmlns="" xmlns:a14="http://schemas.microsoft.com/office/drawing/2010/main">
                 <a:solidFill>
                   <a:schemeClr val="accent1"/>
                 </a:solidFill>
               </a14:hiddenFill>
             </a:ext>
             <a:ext uri="{91240B29-F687-4f45-9708-019B960494DF}">
-              <a14:hiddenLine xmlns:a14="http://schemas.microsoft.com/office/drawing/2010/main" xmlns="" w="9525">
+              <a14:hiddenLine xmlns="" xmlns:a14="http://schemas.microsoft.com/office/drawing/2010/main" w="9525">
                 <a:solidFill>
                   <a:schemeClr val="tx1"/>
                 </a:solidFill>
@@ -8459,7 +8459,7 @@
               </a14:hiddenLine>
             </a:ext>
             <a:ext uri="{AF507438-7753-43e0-B8FC-AC1667EBCBE1}">
-              <a14:hiddenEffects xmlns:a14="http://schemas.microsoft.com/office/drawing/2010/main" xmlns="">
+              <a14:hiddenEffects xmlns="" xmlns:a14="http://schemas.microsoft.com/office/drawing/2010/main">
                 <a:effectLst>
                   <a:outerShdw dist="35921" dir="2700000" algn="ctr" rotWithShape="0">
                     <a:schemeClr val="bg2"/>
@@ -8525,14 +8525,14 @@
           <a:effectLst/>
           <a:extLst>
             <a:ext uri="{909E8E84-426E-40dd-AFC4-6F175D3DCCD1}">
-              <a14:hiddenFill xmlns:a14="http://schemas.microsoft.com/office/drawing/2010/main" xmlns="">
+              <a14:hiddenFill xmlns="" xmlns:a14="http://schemas.microsoft.com/office/drawing/2010/main">
                 <a:solidFill>
                   <a:schemeClr val="accent1"/>
                 </a:solidFill>
               </a14:hiddenFill>
             </a:ext>
             <a:ext uri="{91240B29-F687-4f45-9708-019B960494DF}">
-              <a14:hiddenLine xmlns:a14="http://schemas.microsoft.com/office/drawing/2010/main" xmlns="" w="9525">
+              <a14:hiddenLine xmlns="" xmlns:a14="http://schemas.microsoft.com/office/drawing/2010/main" w="9525">
                 <a:solidFill>
                   <a:schemeClr val="tx1"/>
                 </a:solidFill>
@@ -8542,7 +8542,7 @@
               </a14:hiddenLine>
             </a:ext>
             <a:ext uri="{AF507438-7753-43e0-B8FC-AC1667EBCBE1}">
-              <a14:hiddenEffects xmlns:a14="http://schemas.microsoft.com/office/drawing/2010/main" xmlns="">
+              <a14:hiddenEffects xmlns="" xmlns:a14="http://schemas.microsoft.com/office/drawing/2010/main">
                 <a:effectLst>
                   <a:outerShdw dist="35921" dir="2700000" algn="ctr" rotWithShape="0">
                     <a:schemeClr val="bg2"/>
@@ -8591,14 +8591,14 @@
           <a:effectLst/>
           <a:extLst>
             <a:ext uri="{909E8E84-426E-40dd-AFC4-6F175D3DCCD1}">
-              <a14:hiddenFill xmlns:a14="http://schemas.microsoft.com/office/drawing/2010/main" xmlns="">
+              <a14:hiddenFill xmlns="" xmlns:a14="http://schemas.microsoft.com/office/drawing/2010/main">
                 <a:solidFill>
                   <a:schemeClr val="accent1"/>
                 </a:solidFill>
               </a14:hiddenFill>
             </a:ext>
             <a:ext uri="{91240B29-F687-4f45-9708-019B960494DF}">
-              <a14:hiddenLine xmlns:a14="http://schemas.microsoft.com/office/drawing/2010/main" xmlns="" w="9525" algn="ctr">
+              <a14:hiddenLine xmlns="" xmlns:a14="http://schemas.microsoft.com/office/drawing/2010/main" w="9525" algn="ctr">
                 <a:solidFill>
                   <a:schemeClr val="tx1"/>
                 </a:solidFill>
@@ -8608,7 +8608,7 @@
               </a14:hiddenLine>
             </a:ext>
             <a:ext uri="{AF507438-7753-43e0-B8FC-AC1667EBCBE1}">
-              <a14:hiddenEffects xmlns:a14="http://schemas.microsoft.com/office/drawing/2010/main" xmlns="">
+              <a14:hiddenEffects xmlns="" xmlns:a14="http://schemas.microsoft.com/office/drawing/2010/main">
                 <a:effectLst>
                   <a:outerShdw dist="35921" dir="2700000" algn="ctr" rotWithShape="0">
                     <a:schemeClr val="bg2"/>
@@ -9502,13 +9502,7 @@
               <a:rPr lang="en-US" b="1" dirty="0" smtClean="0">
                 <a:latin typeface="Century" panose="02040604050505020304" pitchFamily="18" charset="0"/>
               </a:rPr>
-              <a:t>Analytics </a:t>
-            </a:r>
-            <a:r>
-              <a:rPr lang="en-US" b="1" dirty="0" smtClean="0">
-                <a:latin typeface="Century" panose="02040604050505020304" pitchFamily="18" charset="0"/>
-              </a:rPr>
-              <a:t>Project:  </a:t>
+              <a:t>Analytics Project:  </a:t>
             </a:r>
             <a:r>
               <a:rPr lang="en-US" b="1" dirty="0" smtClean="0">
@@ -9539,13 +9533,25 @@
               <a:rPr lang="en-US" b="1" dirty="0" smtClean="0">
                 <a:latin typeface="Century" panose="02040604050505020304" pitchFamily="18" charset="0"/>
               </a:rPr>
-              <a:t>Team</a:t>
+              <a:t>Team:  </a:t>
+            </a:r>
+            <a:r>
+              <a:rPr lang="en-US" b="1" dirty="0" err="1" smtClean="0">
+                <a:solidFill>
+                  <a:srgbClr val="FF0000"/>
+                </a:solidFill>
+                <a:latin typeface="Century" panose="02040604050505020304" pitchFamily="18" charset="0"/>
+              </a:rPr>
+              <a:t>Girish</a:t>
             </a:r>
             <a:r>
               <a:rPr lang="en-US" b="1" dirty="0" smtClean="0">
+                <a:solidFill>
+                  <a:srgbClr val="FF0000"/>
+                </a:solidFill>
                 <a:latin typeface="Century" panose="02040604050505020304" pitchFamily="18" charset="0"/>
               </a:rPr>
-              <a:t>:  </a:t>
+              <a:t> Ganesh </a:t>
             </a:r>
             <a:r>
               <a:rPr lang="en-US" b="1" dirty="0" err="1" smtClean="0">
@@ -9554,7 +9560,7 @@
                 </a:solidFill>
                 <a:latin typeface="Century" panose="02040604050505020304" pitchFamily="18" charset="0"/>
               </a:rPr>
-              <a:t>Girish</a:t>
+              <a:t>Prabhu</a:t>
             </a:r>
             <a:r>
               <a:rPr lang="en-US" b="1" dirty="0" smtClean="0">
@@ -9563,46 +9569,22 @@
                 </a:solidFill>
                 <a:latin typeface="Century" panose="02040604050505020304" pitchFamily="18" charset="0"/>
               </a:rPr>
-              <a:t> Ganesh </a:t>
-            </a:r>
-            <a:r>
-              <a:rPr lang="en-US" b="1" dirty="0" err="1" smtClean="0">
+              <a:t> (ggp234)</a:t>
+            </a:r>
+          </a:p>
+          <a:p>
+            <a:pPr marL="0" indent="0">
+              <a:buNone/>
+            </a:pPr>
+            <a:r>
+              <a:rPr lang="en-US" b="1" dirty="0" smtClean="0">
                 <a:solidFill>
                   <a:srgbClr val="FF0000"/>
                 </a:solidFill>
                 <a:latin typeface="Century" panose="02040604050505020304" pitchFamily="18" charset="0"/>
               </a:rPr>
-              <a:t>Prabhu</a:t>
-            </a:r>
-            <a:r>
-              <a:rPr lang="en-US" b="1" dirty="0" smtClean="0">
-                <a:solidFill>
-                  <a:srgbClr val="FF0000"/>
-                </a:solidFill>
-                <a:latin typeface="Century" panose="02040604050505020304" pitchFamily="18" charset="0"/>
-              </a:rPr>
-              <a:t> (ggp234)</a:t>
-            </a:r>
-          </a:p>
-          <a:p>
-            <a:pPr marL="0" indent="0">
-              <a:buNone/>
-            </a:pPr>
-            <a:r>
-              <a:rPr lang="en-US" b="1" dirty="0" smtClean="0">
-                <a:solidFill>
-                  <a:srgbClr val="FF0000"/>
-                </a:solidFill>
-                <a:latin typeface="Century" panose="02040604050505020304" pitchFamily="18" charset="0"/>
-              </a:rPr>
               <a:t>Rahul Ramesh Kumar (rrk310)</a:t>
             </a:r>
-            <a:endParaRPr lang="en-US" b="1" dirty="0" smtClean="0">
-              <a:solidFill>
-                <a:srgbClr val="FF0000"/>
-              </a:solidFill>
-              <a:latin typeface="Century" panose="02040604050505020304" pitchFamily="18" charset="0"/>
-            </a:endParaRPr>
           </a:p>
           <a:p>
             <a:pPr marL="0" indent="0">
@@ -9965,9 +9947,6 @@
               </a:rPr>
               <a:t>10</a:t>
             </a:r>
-            <a:endParaRPr lang="en-US" altLang="en-US" sz="900" dirty="0" smtClean="0">
-              <a:latin typeface="Verdana" pitchFamily="34" charset="0"/>
-            </a:endParaRPr>
           </a:p>
         </p:txBody>
       </p:sp>
@@ -10083,12 +10062,6 @@
               </a:rPr>
               <a:t> which are highly recognized in the Big data open source world.</a:t>
             </a:r>
-            <a:endParaRPr lang="en-US" sz="2000" b="1" dirty="0" smtClean="0">
-              <a:solidFill>
-                <a:srgbClr val="FF0000"/>
-              </a:solidFill>
-              <a:latin typeface="Century" panose="02040604050505020304" pitchFamily="18" charset="0"/>
-            </a:endParaRPr>
           </a:p>
           <a:p>
             <a:pPr marL="0" indent="0">
@@ -10128,13 +10101,22 @@
               <a:buNone/>
             </a:pPr>
             <a:r>
+              <a:rPr lang="en-US" sz="2000" b="1" dirty="0">
+                <a:solidFill>
+                  <a:srgbClr val="FF0000"/>
+                </a:solidFill>
+                <a:latin typeface="Century" panose="02040604050505020304" pitchFamily="18" charset="0"/>
+              </a:rPr>
+              <a:t>We </a:t>
+            </a:r>
+            <a:r>
               <a:rPr lang="en-US" sz="2000" b="1" dirty="0" smtClean="0">
                 <a:solidFill>
                   <a:srgbClr val="FF0000"/>
                 </a:solidFill>
                 <a:latin typeface="Century" panose="02040604050505020304" pitchFamily="18" charset="0"/>
               </a:rPr>
-              <a:t>We thank the NYU HPC for providing the </a:t>
+              <a:t>thank </a:t>
             </a:r>
             <a:r>
               <a:rPr lang="en-US" sz="2000" b="1" dirty="0">
@@ -10143,6 +10125,47 @@
                 </a:solidFill>
                 <a:latin typeface="Century" panose="02040604050505020304" pitchFamily="18" charset="0"/>
               </a:rPr>
+              <a:t>Professor Suzanne McIntosh for introducing us to the various big data tools and providing valuable feedback and advice during the course of our project</a:t>
+            </a:r>
+            <a:r>
+              <a:rPr lang="en-US" sz="2000" b="1" dirty="0" smtClean="0">
+                <a:solidFill>
+                  <a:srgbClr val="FF0000"/>
+                </a:solidFill>
+                <a:latin typeface="Century" panose="02040604050505020304" pitchFamily="18" charset="0"/>
+              </a:rPr>
+              <a:t>.</a:t>
+            </a:r>
+          </a:p>
+          <a:p>
+            <a:pPr marL="0" indent="0">
+              <a:buNone/>
+            </a:pPr>
+            <a:r>
+              <a:rPr lang="en-US" sz="2000" b="1" dirty="0">
+                <a:solidFill>
+                  <a:srgbClr val="FF0000"/>
+                </a:solidFill>
+                <a:latin typeface="Century" panose="02040604050505020304" pitchFamily="18" charset="0"/>
+              </a:rPr>
+              <a:t>We would also like to </a:t>
+            </a:r>
+            <a:r>
+              <a:rPr lang="en-US" sz="2000" b="1" dirty="0" smtClean="0">
+                <a:solidFill>
+                  <a:srgbClr val="FF0000"/>
+                </a:solidFill>
+                <a:latin typeface="Century" panose="02040604050505020304" pitchFamily="18" charset="0"/>
+              </a:rPr>
+              <a:t>thank NYU HPC for providing the </a:t>
+            </a:r>
+            <a:r>
+              <a:rPr lang="en-US" sz="2000" b="1" dirty="0">
+                <a:solidFill>
+                  <a:srgbClr val="FF0000"/>
+                </a:solidFill>
+                <a:latin typeface="Century" panose="02040604050505020304" pitchFamily="18" charset="0"/>
+              </a:rPr>
               <a:t>D</a:t>
             </a:r>
             <a:r>
@@ -10152,54 +10175,7 @@
                 </a:solidFill>
                 <a:latin typeface="Century" panose="02040604050505020304" pitchFamily="18" charset="0"/>
               </a:rPr>
-              <a:t>umbo cluster for performing computation of our Analyti</a:t>
-            </a:r>
-            <a:r>
-              <a:rPr lang="en-US" sz="2000" b="1" dirty="0" smtClean="0">
-                <a:solidFill>
-                  <a:srgbClr val="FF0000"/>
-                </a:solidFill>
-                <a:latin typeface="Century" panose="02040604050505020304" pitchFamily="18" charset="0"/>
-              </a:rPr>
-              <a:t>c.</a:t>
-            </a:r>
-            <a:endParaRPr lang="en-US" sz="1050" b="1" dirty="0">
-              <a:solidFill>
-                <a:srgbClr val="FF0000"/>
-              </a:solidFill>
-              <a:latin typeface="Century" panose="02040604050505020304" pitchFamily="18" charset="0"/>
-            </a:endParaRPr>
-          </a:p>
-          <a:p>
-            <a:pPr marL="0" indent="0">
-              <a:buNone/>
-            </a:pPr>
-            <a:r>
-              <a:rPr lang="en-US" sz="2000" b="1" dirty="0" smtClean="0">
-                <a:solidFill>
-                  <a:srgbClr val="FF0000"/>
-                </a:solidFill>
-                <a:latin typeface="Century" panose="02040604050505020304" pitchFamily="18" charset="0"/>
-              </a:rPr>
-              <a:t>We would also like to </a:t>
-            </a:r>
-            <a:r>
-              <a:rPr lang="en-US" sz="2000" b="1" dirty="0">
-                <a:solidFill>
-                  <a:srgbClr val="FF0000"/>
-                </a:solidFill>
-                <a:latin typeface="Century" panose="02040604050505020304" pitchFamily="18" charset="0"/>
-              </a:rPr>
-              <a:t>thank Professor Suzanne </a:t>
-            </a:r>
-            <a:r>
-              <a:rPr lang="en-US" sz="2000" b="1" dirty="0" smtClean="0">
-                <a:solidFill>
-                  <a:srgbClr val="FF0000"/>
-                </a:solidFill>
-                <a:latin typeface="Century" panose="02040604050505020304" pitchFamily="18" charset="0"/>
-              </a:rPr>
-              <a:t>McIntosh for introducing us to the various big data tools and providing valuable feedback and advice during the course of our project.</a:t>
+              <a:t>umbo cluster for performing computation of our Analytic.</a:t>
             </a:r>
             <a:endParaRPr lang="en-US" sz="1050" b="1" dirty="0">
               <a:solidFill>
@@ -10458,9 +10434,6 @@
               </a:rPr>
               <a:t>11</a:t>
             </a:r>
-            <a:endParaRPr lang="en-US" altLang="en-US" sz="900" dirty="0" smtClean="0">
-              <a:latin typeface="Verdana" pitchFamily="34" charset="0"/>
-            </a:endParaRPr>
           </a:p>
         </p:txBody>
       </p:sp>
@@ -11033,17 +11006,8 @@
               <a:rPr lang="en-US" altLang="en-US" sz="900" dirty="0" smtClean="0">
                 <a:latin typeface="Verdana" pitchFamily="34" charset="0"/>
               </a:rPr>
-              <a:t>Slide </a:t>
-            </a:r>
-            <a:r>
-              <a:rPr lang="en-US" altLang="en-US" sz="900" dirty="0" smtClean="0">
-                <a:latin typeface="Verdana" pitchFamily="34" charset="0"/>
-              </a:rPr>
-              <a:t>12</a:t>
-            </a:r>
-            <a:endParaRPr lang="en-US" altLang="en-US" sz="900" dirty="0" smtClean="0">
-              <a:latin typeface="Verdana" pitchFamily="34" charset="0"/>
-            </a:endParaRPr>
+              <a:t>Slide 12</a:t>
+            </a:r>
           </a:p>
         </p:txBody>
       </p:sp>
@@ -11497,9 +11461,6 @@
               </a:rPr>
               <a:t>Who are the users of this analytic?     </a:t>
             </a:r>
-            <a:endParaRPr lang="en-US" sz="2000" b="1" dirty="0" smtClean="0">
-              <a:latin typeface="Century" panose="02040604050505020304" pitchFamily="18" charset="0"/>
-            </a:endParaRPr>
           </a:p>
           <a:p>
             <a:pPr marL="0" indent="0">
@@ -11514,12 +11475,6 @@
               </a:rPr>
               <a:t>NYS DOT and NYC Road Safety Department</a:t>
             </a:r>
-            <a:endParaRPr lang="en-US" sz="2000" b="1" dirty="0" smtClean="0">
-              <a:solidFill>
-                <a:srgbClr val="FF0000"/>
-              </a:solidFill>
-              <a:latin typeface="Century" panose="02040604050505020304" pitchFamily="18" charset="0"/>
-            </a:endParaRPr>
           </a:p>
           <a:p>
             <a:pPr marL="0" indent="0">
@@ -11548,12 +11503,6 @@
               </a:rPr>
               <a:t>Drivers/Pedestrians</a:t>
             </a:r>
-            <a:endParaRPr lang="en-US" sz="2000" b="1" dirty="0" smtClean="0">
-              <a:solidFill>
-                <a:srgbClr val="FF0000"/>
-              </a:solidFill>
-              <a:latin typeface="Century" panose="02040604050505020304" pitchFamily="18" charset="0"/>
-            </a:endParaRPr>
           </a:p>
           <a:p>
             <a:pPr marL="0" indent="0">
@@ -11571,36 +11520,21 @@
               <a:rPr lang="en-US" sz="2000" b="1" dirty="0" smtClean="0">
                 <a:latin typeface="Century" panose="02040604050505020304" pitchFamily="18" charset="0"/>
               </a:rPr>
-              <a:t>Why is this analytic important</a:t>
-            </a:r>
-            <a:r>
-              <a:rPr lang="en-US" sz="2000" b="1" dirty="0" smtClean="0">
+              <a:t>Why is this analytic important?</a:t>
+            </a:r>
+          </a:p>
+          <a:p>
+            <a:pPr marL="0" indent="0">
+              <a:buNone/>
+            </a:pPr>
+            <a:r>
+              <a:rPr lang="en-US" sz="2000" b="1" dirty="0">
+                <a:solidFill>
+                  <a:srgbClr val="FF0000"/>
+                </a:solidFill>
                 <a:latin typeface="Century" panose="02040604050505020304" pitchFamily="18" charset="0"/>
               </a:rPr>
-              <a:t>?</a:t>
-            </a:r>
-          </a:p>
-          <a:p>
-            <a:pPr marL="0" indent="0">
-              <a:buNone/>
-            </a:pPr>
-            <a:r>
-              <a:rPr lang="en-US" sz="2000" b="1" dirty="0">
-                <a:solidFill>
-                  <a:srgbClr val="FF0000"/>
-                </a:solidFill>
-                <a:latin typeface="Century" panose="02040604050505020304" pitchFamily="18" charset="0"/>
-              </a:rPr>
-              <a:t>There are a number of accidents in NYC whose reasons are not properly accounted for. </a:t>
-            </a:r>
-            <a:r>
-              <a:rPr lang="en-US" sz="2000" b="1" dirty="0">
-                <a:solidFill>
-                  <a:srgbClr val="FF0000"/>
-                </a:solidFill>
-                <a:latin typeface="Century" panose="02040604050505020304" pitchFamily="18" charset="0"/>
-              </a:rPr>
-              <a:t>In this analytic, we aim to provide an accurate description for the reason that attributed to the accidents so that it can be used further to improve the road safety conditions and bring safety awareness </a:t>
+              <a:t>There are a number of accidents in NYC whose reasons are not properly accounted for. In this analytic, we aim to provide an accurate description for the reason that attributed to the accidents so that it can be used further to improve the road safety conditions and bring safety awareness </a:t>
             </a:r>
             <a:r>
               <a:rPr lang="en-US" sz="2000" b="1" dirty="0" smtClean="0">
@@ -11876,9 +11810,6 @@
               </a:rPr>
               <a:t>3</a:t>
             </a:r>
-            <a:endParaRPr lang="en-US" altLang="en-US" sz="900" dirty="0" smtClean="0">
-              <a:latin typeface="Verdana" pitchFamily="34" charset="0"/>
-            </a:endParaRPr>
           </a:p>
         </p:txBody>
       </p:sp>
@@ -12052,12 +11983,6 @@
               </a:rPr>
               <a:t>The big data tools used to developed the analytic are highly scalable and fault tolerant.</a:t>
             </a:r>
-            <a:endParaRPr lang="en-US" sz="2000" b="1" dirty="0" smtClean="0">
-              <a:solidFill>
-                <a:srgbClr val="FF0000"/>
-              </a:solidFill>
-              <a:latin typeface="Century" panose="02040604050505020304" pitchFamily="18" charset="0"/>
-            </a:endParaRPr>
           </a:p>
           <a:p>
             <a:pPr marL="457200" indent="-457200">
@@ -12086,12 +12011,6 @@
               </a:rPr>
               <a:t>The final rules were obtained by using a very high confidence of 80% thereby providing accurate results.</a:t>
             </a:r>
-            <a:endParaRPr lang="en-US" sz="2000" b="1" dirty="0" smtClean="0">
-              <a:solidFill>
-                <a:srgbClr val="FF0000"/>
-              </a:solidFill>
-              <a:latin typeface="Century" panose="02040604050505020304" pitchFamily="18" charset="0"/>
-            </a:endParaRPr>
           </a:p>
         </p:txBody>
       </p:sp>
@@ -12335,9 +12254,6 @@
               </a:rPr>
               <a:t>4</a:t>
             </a:r>
-            <a:endParaRPr lang="en-US" altLang="en-US" sz="900" dirty="0" smtClean="0">
-              <a:latin typeface="Verdana" pitchFamily="34" charset="0"/>
-            </a:endParaRPr>
           </a:p>
         </p:txBody>
       </p:sp>
@@ -12449,12 +12365,6 @@
               </a:rPr>
               <a:t>NYPD Motor Vehicle Collision Data</a:t>
             </a:r>
-            <a:endParaRPr lang="en-US" sz="2000" b="1" dirty="0">
-              <a:solidFill>
-                <a:srgbClr val="FF0000"/>
-              </a:solidFill>
-              <a:latin typeface="Century" panose="02040604050505020304" pitchFamily="18" charset="0"/>
-            </a:endParaRPr>
           </a:p>
           <a:p>
             <a:pPr marL="0" indent="0">
@@ -12509,23 +12419,8 @@
                 </a:solidFill>
                 <a:latin typeface="Century" panose="02040604050505020304" pitchFamily="18" charset="0"/>
               </a:rPr>
-              <a:t>accident. </a:t>
-            </a:r>
-            <a:r>
-              <a:rPr lang="en-US" sz="2000" b="1" dirty="0">
-                <a:solidFill>
-                  <a:srgbClr val="FF0000"/>
-                </a:solidFill>
-                <a:latin typeface="Century" panose="02040604050505020304" pitchFamily="18" charset="0"/>
-              </a:rPr>
-              <a:t>It also contains extra information just as street name, zip code, fatalities/injuries etc.</a:t>
-            </a:r>
-            <a:endParaRPr lang="en-US" sz="2000" b="1" dirty="0">
-              <a:solidFill>
-                <a:srgbClr val="FF0000"/>
-              </a:solidFill>
-              <a:latin typeface="Century" panose="02040604050505020304" pitchFamily="18" charset="0"/>
-            </a:endParaRPr>
+              <a:t>accident. It also contains extra information just as street name, zip code, fatalities/injuries etc.</a:t>
+            </a:r>
           </a:p>
           <a:p>
             <a:pPr marL="0" indent="0">
@@ -12535,13 +12430,7 @@
               <a:rPr lang="en-US" sz="2000" b="1" dirty="0" smtClean="0">
                 <a:latin typeface="Century" panose="02040604050505020304" pitchFamily="18" charset="0"/>
               </a:rPr>
-              <a:t>Size </a:t>
-            </a:r>
-            <a:r>
-              <a:rPr lang="en-US" sz="2000" b="1" dirty="0" smtClean="0">
-                <a:latin typeface="Century" panose="02040604050505020304" pitchFamily="18" charset="0"/>
-              </a:rPr>
-              <a:t>of data:  </a:t>
+              <a:t>Size of data:  </a:t>
             </a:r>
             <a:r>
               <a:rPr lang="en-US" sz="2000" b="1" dirty="0" smtClean="0">
@@ -12625,16 +12514,7 @@
                 </a:solidFill>
                 <a:latin typeface="Century" panose="02040604050505020304" pitchFamily="18" charset="0"/>
               </a:rPr>
-              <a:t>the geometry, length, width of the various streets in NYC. </a:t>
-            </a:r>
-            <a:r>
-              <a:rPr lang="en-US" sz="2000" b="1" dirty="0">
-                <a:solidFill>
-                  <a:srgbClr val="FF0000"/>
-                </a:solidFill>
-                <a:latin typeface="Century" panose="02040604050505020304" pitchFamily="18" charset="0"/>
-              </a:rPr>
-              <a:t>The rating of each street is mentioned in this dataset along with the date of the assessment. </a:t>
+              <a:t>the geometry, length, width of the various streets in NYC. The rating of each street is mentioned in this dataset along with the date of the assessment. </a:t>
             </a:r>
             <a:r>
               <a:rPr lang="en-US" sz="2000" b="1" dirty="0" smtClean="0">
@@ -12907,13 +12787,7 @@
               <a:rPr lang="en-US" altLang="en-US" sz="900" dirty="0">
                 <a:latin typeface="Verdana" pitchFamily="34" charset="0"/>
               </a:rPr>
-              <a:t>Slide </a:t>
-            </a:r>
-            <a:r>
-              <a:rPr lang="en-US" altLang="en-US" sz="900" dirty="0">
-                <a:latin typeface="Verdana" pitchFamily="34" charset="0"/>
-              </a:rPr>
-              <a:t>5</a:t>
+              <a:t>Slide 5</a:t>
             </a:r>
             <a:endParaRPr lang="en-US" altLang="en-US" sz="900" dirty="0" smtClean="0">
               <a:latin typeface="Verdana" pitchFamily="34" charset="0"/>
@@ -12999,13 +12873,7 @@
               <a:rPr lang="en-US" sz="2800" b="1" dirty="0" smtClean="0">
                 <a:latin typeface="Century" panose="02040604050505020304" pitchFamily="18" charset="0"/>
               </a:rPr>
-              <a:t>Design </a:t>
-            </a:r>
-            <a:r>
-              <a:rPr lang="en-US" sz="2800" b="1" dirty="0" smtClean="0">
-                <a:latin typeface="Century" panose="02040604050505020304" pitchFamily="18" charset="0"/>
-              </a:rPr>
-              <a:t>Diagram</a:t>
+              <a:t>Design Diagram</a:t>
             </a:r>
           </a:p>
           <a:p>
@@ -13087,9 +12955,6 @@
               </a:rPr>
               <a:t>Platform(s) on which the analytic ran: </a:t>
             </a:r>
-            <a:endParaRPr lang="en-US" sz="2000" b="1" dirty="0" smtClean="0">
-              <a:latin typeface="Century" panose="02040604050505020304" pitchFamily="18" charset="0"/>
-            </a:endParaRPr>
           </a:p>
           <a:p>
             <a:pPr marL="0" indent="0">
@@ -13445,7 +13310,7 @@
       </p:sp>
       <p:pic>
         <p:nvPicPr>
-          <p:cNvPr id="3" name="Picture 2"/>
+          <p:cNvPr id="2" name="Picture 1"/>
           <p:cNvPicPr>
             <a:picLocks noChangeAspect="1"/>
           </p:cNvPicPr>
@@ -13465,8 +13330,8 @@
         </p:blipFill>
         <p:spPr>
           <a:xfrm>
-            <a:off x="1747857" y="1100394"/>
-            <a:ext cx="5648285" cy="5757606"/>
+            <a:off x="1763799" y="1273284"/>
+            <a:ext cx="5616402" cy="5203716"/>
           </a:xfrm>
           <a:prstGeom prst="rect">
             <a:avLst/>
@@ -13532,38 +13397,6 @@
           </a:p>
         </p:txBody>
       </p:sp>
-      <p:pic>
-        <p:nvPicPr>
-          <p:cNvPr id="6" name="Content Placeholder 5"/>
-          <p:cNvPicPr>
-            <a:picLocks noGrp="1" noChangeAspect="1"/>
-          </p:cNvPicPr>
-          <p:nvPr>
-            <p:ph idx="1"/>
-          </p:nvPr>
-        </p:nvPicPr>
-        <p:blipFill>
-          <a:blip r:embed="rId2">
-            <a:extLst>
-              <a:ext uri="{28A0092B-C50C-407E-A947-70E740481C1C}">
-                <a14:useLocalDpi xmlns:a14="http://schemas.microsoft.com/office/drawing/2010/main" val="0"/>
-              </a:ext>
-            </a:extLst>
-          </a:blip>
-          <a:stretch>
-            <a:fillRect/>
-          </a:stretch>
-        </p:blipFill>
-        <p:spPr>
-          <a:xfrm>
-            <a:off x="2383749" y="1239837"/>
-            <a:ext cx="4376501" cy="4987925"/>
-          </a:xfrm>
-          <a:prstGeom prst="rect">
-            <a:avLst/>
-          </a:prstGeom>
-        </p:spPr>
-      </p:pic>
       <p:sp>
         <p:nvSpPr>
           <p:cNvPr id="8" name="Rectangle 2"/>
@@ -13603,6 +13436,36 @@
           </a:p>
         </p:txBody>
       </p:sp>
+      <p:pic>
+        <p:nvPicPr>
+          <p:cNvPr id="5" name="Picture 4"/>
+          <p:cNvPicPr>
+            <a:picLocks noChangeAspect="1"/>
+          </p:cNvPicPr>
+          <p:nvPr/>
+        </p:nvPicPr>
+        <p:blipFill>
+          <a:blip r:embed="rId2">
+            <a:extLst>
+              <a:ext uri="{28A0092B-C50C-407E-A947-70E740481C1C}">
+                <a14:useLocalDpi xmlns:a14="http://schemas.microsoft.com/office/drawing/2010/main" val="0"/>
+              </a:ext>
+            </a:extLst>
+          </a:blip>
+          <a:stretch>
+            <a:fillRect/>
+          </a:stretch>
+        </p:blipFill>
+        <p:spPr>
+          <a:xfrm>
+            <a:off x="1834438" y="1194955"/>
+            <a:ext cx="5475123" cy="5282045"/>
+          </a:xfrm>
+          <a:prstGeom prst="rect">
+            <a:avLst/>
+          </a:prstGeom>
+        </p:spPr>
+      </p:pic>
     </p:spTree>
     <p:extLst>
       <p:ext uri="{BB962C8B-B14F-4D97-AF65-F5344CB8AC3E}">
@@ -13835,13 +13698,7 @@
               <a:rPr lang="en-US" altLang="en-US" sz="900" dirty="0">
                 <a:latin typeface="Verdana" pitchFamily="34" charset="0"/>
               </a:rPr>
-              <a:t>Slide </a:t>
-            </a:r>
-            <a:r>
-              <a:rPr lang="en-US" altLang="en-US" sz="900" dirty="0">
-                <a:latin typeface="Verdana" pitchFamily="34" charset="0"/>
-              </a:rPr>
-              <a:t>8</a:t>
+              <a:t>Slide 8</a:t>
             </a:r>
             <a:endParaRPr lang="en-US" altLang="en-US" sz="900" dirty="0" smtClean="0">
               <a:latin typeface="Verdana" pitchFamily="34" charset="0"/>
@@ -13958,7 +13815,16 @@
                 </a:solidFill>
                 <a:latin typeface="Century" panose="02040604050505020304" pitchFamily="18" charset="0"/>
               </a:rPr>
-              <a:t>5 Reasons for accidents </a:t>
+              <a:t>5 Reasons for accidents are Driver inattention, </a:t>
+            </a:r>
+            <a:r>
+              <a:rPr lang="en-US" sz="2000" b="1" dirty="0" smtClean="0">
+                <a:solidFill>
+                  <a:srgbClr val="FF0000"/>
+                </a:solidFill>
+                <a:latin typeface="Century" panose="02040604050505020304" pitchFamily="18" charset="0"/>
+              </a:rPr>
+              <a:t>Other Vehicular, Failure </a:t>
             </a:r>
             <a:r>
               <a:rPr lang="en-US" sz="2000" b="1" dirty="0">
@@ -13967,43 +13833,25 @@
                 </a:solidFill>
                 <a:latin typeface="Century" panose="02040604050505020304" pitchFamily="18" charset="0"/>
               </a:rPr>
-              <a:t>are Driver </a:t>
-            </a:r>
-            <a:r>
-              <a:rPr lang="en-US" sz="2000" b="1" dirty="0">
+              <a:t>to yield right-of-way</a:t>
+            </a:r>
+            <a:r>
+              <a:rPr lang="en-US" sz="2000" b="1">
                 <a:solidFill>
                   <a:srgbClr val="FF0000"/>
                 </a:solidFill>
                 <a:latin typeface="Century" panose="02040604050505020304" pitchFamily="18" charset="0"/>
               </a:rPr>
-              <a:t>inattention, </a:t>
-            </a:r>
-            <a:r>
-              <a:rPr lang="en-US" sz="2000" b="1" dirty="0">
+              <a:t>, </a:t>
+            </a:r>
+            <a:r>
+              <a:rPr lang="en-US" sz="2000" b="1" smtClean="0">
                 <a:solidFill>
                   <a:srgbClr val="FF0000"/>
                 </a:solidFill>
                 <a:latin typeface="Century" panose="02040604050505020304" pitchFamily="18" charset="0"/>
               </a:rPr>
-              <a:t>Failure to yield right-of-way, </a:t>
-            </a:r>
-            <a:r>
-              <a:rPr lang="en-US" sz="2000" b="1" dirty="0">
-                <a:solidFill>
-                  <a:srgbClr val="FF0000"/>
-                </a:solidFill>
-                <a:latin typeface="Century" panose="02040604050505020304" pitchFamily="18" charset="0"/>
-              </a:rPr>
-              <a:t>Fatigue, </a:t>
-            </a:r>
-            <a:r>
-              <a:rPr lang="en-US" sz="2000" b="1" dirty="0">
-                <a:solidFill>
-                  <a:srgbClr val="FF0000"/>
-                </a:solidFill>
-                <a:latin typeface="Century" panose="02040604050505020304" pitchFamily="18" charset="0"/>
-              </a:rPr>
-              <a:t>Backing unsafely &amp; Lost </a:t>
+              <a:t>Fatigue and Lost </a:t>
             </a:r>
             <a:r>
               <a:rPr lang="en-US" sz="2000" b="1" dirty="0" smtClean="0">
@@ -14502,9 +14350,6 @@
               </a:rPr>
               <a:t>9</a:t>
             </a:r>
-            <a:endParaRPr lang="en-US" altLang="en-US" sz="900" dirty="0" smtClean="0">
-              <a:latin typeface="Verdana" pitchFamily="34" charset="0"/>
-            </a:endParaRPr>
           </a:p>
         </p:txBody>
       </p:sp>
@@ -14605,29 +14450,17 @@
               <a:rPr lang="en-US" sz="2000" b="1" dirty="0" smtClean="0">
                 <a:latin typeface="Century" panose="02040604050505020304" pitchFamily="18" charset="0"/>
               </a:rPr>
-              <a:t>1</a:t>
-            </a:r>
-            <a:r>
-              <a:rPr lang="en-US" sz="2000" b="1" dirty="0" smtClean="0">
+              <a:t>1. </a:t>
+            </a:r>
+            <a:r>
+              <a:rPr lang="en-US" sz="2000" b="1" dirty="0">
+                <a:solidFill>
+                  <a:srgbClr val="FF0000"/>
+                </a:solidFill>
                 <a:latin typeface="Century" panose="02040604050505020304" pitchFamily="18" charset="0"/>
               </a:rPr>
-              <a:t>. </a:t>
-            </a:r>
-            <a:r>
-              <a:rPr lang="en-US" sz="2000" b="1" dirty="0">
-                <a:solidFill>
-                  <a:srgbClr val="FF0000"/>
-                </a:solidFill>
-                <a:latin typeface="Century" panose="02040604050505020304" pitchFamily="18" charset="0"/>
-              </a:rPr>
               <a:t>Determining if a particular accident occurred in a street required us to understand the Geographic Coordinate System which took some time to implement and verify the results.</a:t>
             </a:r>
-            <a:endParaRPr lang="en-US" sz="2000" b="1" dirty="0">
-              <a:solidFill>
-                <a:srgbClr val="FF0000"/>
-              </a:solidFill>
-              <a:latin typeface="Century" panose="02040604050505020304" pitchFamily="18" charset="0"/>
-            </a:endParaRPr>
           </a:p>
           <a:p>
             <a:pPr marL="0" indent="0">

</xml_diff>